<commit_message>
Added trinket wiring diagram.
</commit_message>
<xml_diff>
--- a/assets/ppt/images-ppt.pptx
+++ b/assets/ppt/images-ppt.pptx
@@ -6,6 +6,7 @@
   </p:sldMasterIdLst>
   <p:sldIdLst>
     <p:sldId id="256" r:id="rId2"/>
+    <p:sldId id="257" r:id="rId3"/>
   </p:sldIdLst>
   <p:sldSz cx="9144000" cy="6858000" type="screen4x3"/>
   <p:notesSz cx="6858000" cy="9144000"/>
@@ -288,7 +289,7 @@
           <a:p>
             <a:fld id="{E7462AF9-74FF-4E9A-86E4-B12D37CEC7B9}" type="datetimeFigureOut">
               <a:rPr lang="en-US" smtClean="0"/>
-              <a:t>11/29/2018</a:t>
+              <a:t>12/8/2018</a:t>
             </a:fld>
             <a:endParaRPr lang="en-US"/>
           </a:p>
@@ -458,7 +459,7 @@
           <a:p>
             <a:fld id="{E7462AF9-74FF-4E9A-86E4-B12D37CEC7B9}" type="datetimeFigureOut">
               <a:rPr lang="en-US" smtClean="0"/>
-              <a:t>11/29/2018</a:t>
+              <a:t>12/8/2018</a:t>
             </a:fld>
             <a:endParaRPr lang="en-US"/>
           </a:p>
@@ -638,7 +639,7 @@
           <a:p>
             <a:fld id="{E7462AF9-74FF-4E9A-86E4-B12D37CEC7B9}" type="datetimeFigureOut">
               <a:rPr lang="en-US" smtClean="0"/>
-              <a:t>11/29/2018</a:t>
+              <a:t>12/8/2018</a:t>
             </a:fld>
             <a:endParaRPr lang="en-US"/>
           </a:p>
@@ -808,7 +809,7 @@
           <a:p>
             <a:fld id="{E7462AF9-74FF-4E9A-86E4-B12D37CEC7B9}" type="datetimeFigureOut">
               <a:rPr lang="en-US" smtClean="0"/>
-              <a:t>11/29/2018</a:t>
+              <a:t>12/8/2018</a:t>
             </a:fld>
             <a:endParaRPr lang="en-US"/>
           </a:p>
@@ -1054,7 +1055,7 @@
           <a:p>
             <a:fld id="{E7462AF9-74FF-4E9A-86E4-B12D37CEC7B9}" type="datetimeFigureOut">
               <a:rPr lang="en-US" smtClean="0"/>
-              <a:t>11/29/2018</a:t>
+              <a:t>12/8/2018</a:t>
             </a:fld>
             <a:endParaRPr lang="en-US"/>
           </a:p>
@@ -1342,7 +1343,7 @@
           <a:p>
             <a:fld id="{E7462AF9-74FF-4E9A-86E4-B12D37CEC7B9}" type="datetimeFigureOut">
               <a:rPr lang="en-US" smtClean="0"/>
-              <a:t>11/29/2018</a:t>
+              <a:t>12/8/2018</a:t>
             </a:fld>
             <a:endParaRPr lang="en-US"/>
           </a:p>
@@ -1764,7 +1765,7 @@
           <a:p>
             <a:fld id="{E7462AF9-74FF-4E9A-86E4-B12D37CEC7B9}" type="datetimeFigureOut">
               <a:rPr lang="en-US" smtClean="0"/>
-              <a:t>11/29/2018</a:t>
+              <a:t>12/8/2018</a:t>
             </a:fld>
             <a:endParaRPr lang="en-US"/>
           </a:p>
@@ -1882,7 +1883,7 @@
           <a:p>
             <a:fld id="{E7462AF9-74FF-4E9A-86E4-B12D37CEC7B9}" type="datetimeFigureOut">
               <a:rPr lang="en-US" smtClean="0"/>
-              <a:t>11/29/2018</a:t>
+              <a:t>12/8/2018</a:t>
             </a:fld>
             <a:endParaRPr lang="en-US"/>
           </a:p>
@@ -1977,7 +1978,7 @@
           <a:p>
             <a:fld id="{E7462AF9-74FF-4E9A-86E4-B12D37CEC7B9}" type="datetimeFigureOut">
               <a:rPr lang="en-US" smtClean="0"/>
-              <a:t>11/29/2018</a:t>
+              <a:t>12/8/2018</a:t>
             </a:fld>
             <a:endParaRPr lang="en-US"/>
           </a:p>
@@ -2254,7 +2255,7 @@
           <a:p>
             <a:fld id="{E7462AF9-74FF-4E9A-86E4-B12D37CEC7B9}" type="datetimeFigureOut">
               <a:rPr lang="en-US" smtClean="0"/>
-              <a:t>11/29/2018</a:t>
+              <a:t>12/8/2018</a:t>
             </a:fld>
             <a:endParaRPr lang="en-US"/>
           </a:p>
@@ -2507,7 +2508,7 @@
           <a:p>
             <a:fld id="{E7462AF9-74FF-4E9A-86E4-B12D37CEC7B9}" type="datetimeFigureOut">
               <a:rPr lang="en-US" smtClean="0"/>
-              <a:t>11/29/2018</a:t>
+              <a:t>12/8/2018</a:t>
             </a:fld>
             <a:endParaRPr lang="en-US"/>
           </a:p>
@@ -2720,7 +2721,7 @@
           <a:p>
             <a:fld id="{E7462AF9-74FF-4E9A-86E4-B12D37CEC7B9}" type="datetimeFigureOut">
               <a:rPr lang="en-US" smtClean="0"/>
-              <a:t>11/29/2018</a:t>
+              <a:t>12/8/2018</a:t>
             </a:fld>
             <a:endParaRPr lang="en-US"/>
           </a:p>
@@ -3930,6 +3931,874 @@
 </p:sld>
 </file>
 
+<file path=ppt/slides/slide2.xml><?xml version="1.0" encoding="utf-8"?>
+<p:sld xmlns:a="http://schemas.openxmlformats.org/drawingml/2006/main" xmlns:r="http://schemas.openxmlformats.org/officeDocument/2006/relationships" xmlns:p="http://schemas.openxmlformats.org/presentationml/2006/main">
+  <p:cSld>
+    <p:spTree>
+      <p:nvGrpSpPr>
+        <p:cNvPr id="1" name=""/>
+        <p:cNvGrpSpPr/>
+        <p:nvPr/>
+      </p:nvGrpSpPr>
+      <p:grpSpPr>
+        <a:xfrm>
+          <a:off x="0" y="0"/>
+          <a:ext cx="0" cy="0"/>
+          <a:chOff x="0" y="0"/>
+          <a:chExt cx="0" cy="0"/>
+        </a:xfrm>
+      </p:grpSpPr>
+      <p:pic>
+        <p:nvPicPr>
+          <p:cNvPr id="6" name="Picture 5"/>
+          <p:cNvPicPr>
+            <a:picLocks noChangeAspect="1"/>
+          </p:cNvPicPr>
+          <p:nvPr/>
+        </p:nvPicPr>
+        <p:blipFill>
+          <a:blip r:embed="rId2" cstate="print">
+            <a:extLst>
+              <a:ext uri="{BEBA8EAE-BF5A-486C-A8C5-ECC9F3942E4B}">
+                <a14:imgProps xmlns:a14="http://schemas.microsoft.com/office/drawing/2010/main">
+                  <a14:imgLayer r:embed="rId3">
+                    <a14:imgEffect>
+                      <a14:backgroundRemoval t="10000" b="90000" l="10000" r="90000"/>
+                    </a14:imgEffect>
+                  </a14:imgLayer>
+                </a14:imgProps>
+              </a:ext>
+              <a:ext uri="{28A0092B-C50C-407E-A947-70E740481C1C}">
+                <a14:useLocalDpi xmlns:a14="http://schemas.microsoft.com/office/drawing/2010/main" val="0"/>
+              </a:ext>
+            </a:extLst>
+          </a:blip>
+          <a:stretch>
+            <a:fillRect/>
+          </a:stretch>
+        </p:blipFill>
+        <p:spPr>
+          <a:xfrm>
+            <a:off x="2994387" y="2331213"/>
+            <a:ext cx="1371599" cy="1877836"/>
+          </a:xfrm>
+          <a:prstGeom prst="rect">
+            <a:avLst/>
+          </a:prstGeom>
+        </p:spPr>
+      </p:pic>
+      <p:pic>
+        <p:nvPicPr>
+          <p:cNvPr id="7" name="Picture 6"/>
+          <p:cNvPicPr>
+            <a:picLocks noChangeAspect="1"/>
+          </p:cNvPicPr>
+          <p:nvPr/>
+        </p:nvPicPr>
+        <p:blipFill>
+          <a:blip r:embed="rId4" cstate="print">
+            <a:extLst>
+              <a:ext uri="{BEBA8EAE-BF5A-486C-A8C5-ECC9F3942E4B}">
+                <a14:imgProps xmlns:a14="http://schemas.microsoft.com/office/drawing/2010/main">
+                  <a14:imgLayer r:embed="rId5">
+                    <a14:imgEffect>
+                      <a14:backgroundRemoval t="6463" b="93311" l="15195" r="89746"/>
+                    </a14:imgEffect>
+                  </a14:imgLayer>
+                </a14:imgProps>
+              </a:ext>
+              <a:ext uri="{28A0092B-C50C-407E-A947-70E740481C1C}">
+                <a14:useLocalDpi xmlns:a14="http://schemas.microsoft.com/office/drawing/2010/main" val="0"/>
+              </a:ext>
+            </a:extLst>
+          </a:blip>
+          <a:stretch>
+            <a:fillRect/>
+          </a:stretch>
+        </p:blipFill>
+        <p:spPr>
+          <a:xfrm>
+            <a:off x="1752600" y="2321804"/>
+            <a:ext cx="1428406" cy="1886009"/>
+          </a:xfrm>
+          <a:prstGeom prst="rect">
+            <a:avLst/>
+          </a:prstGeom>
+        </p:spPr>
+      </p:pic>
+      <p:sp>
+        <p:nvSpPr>
+          <p:cNvPr id="8" name="Oval 7"/>
+          <p:cNvSpPr/>
+          <p:nvPr/>
+        </p:nvSpPr>
+        <p:spPr>
+          <a:xfrm>
+            <a:off x="2805154" y="3226794"/>
+            <a:ext cx="110766" cy="110766"/>
+          </a:xfrm>
+          <a:prstGeom prst="ellipse">
+            <a:avLst/>
+          </a:prstGeom>
+          <a:solidFill>
+            <a:srgbClr val="FFFF00"/>
+          </a:solidFill>
+          <a:ln w="12700">
+            <a:solidFill>
+              <a:schemeClr val="tx1"/>
+            </a:solidFill>
+          </a:ln>
+        </p:spPr>
+        <p:style>
+          <a:lnRef idx="2">
+            <a:schemeClr val="accent1">
+              <a:shade val="50000"/>
+            </a:schemeClr>
+          </a:lnRef>
+          <a:fillRef idx="1">
+            <a:schemeClr val="accent1"/>
+          </a:fillRef>
+          <a:effectRef idx="0">
+            <a:schemeClr val="accent1"/>
+          </a:effectRef>
+          <a:fontRef idx="minor">
+            <a:schemeClr val="lt1"/>
+          </a:fontRef>
+        </p:style>
+        <p:txBody>
+          <a:bodyPr rtlCol="0" anchor="ctr"/>
+          <a:lstStyle/>
+          <a:p>
+            <a:pPr algn="ctr"/>
+            <a:endParaRPr lang="en-US"/>
+          </a:p>
+        </p:txBody>
+      </p:sp>
+      <p:sp>
+        <p:nvSpPr>
+          <p:cNvPr id="9" name="Oval 8"/>
+          <p:cNvSpPr/>
+          <p:nvPr/>
+        </p:nvSpPr>
+        <p:spPr>
+          <a:xfrm>
+            <a:off x="2314403" y="4207813"/>
+            <a:ext cx="110766" cy="110766"/>
+          </a:xfrm>
+          <a:prstGeom prst="ellipse">
+            <a:avLst/>
+          </a:prstGeom>
+          <a:solidFill>
+            <a:srgbClr val="FFFF00"/>
+          </a:solidFill>
+          <a:ln w="12700">
+            <a:solidFill>
+              <a:schemeClr val="tx1"/>
+            </a:solidFill>
+          </a:ln>
+        </p:spPr>
+        <p:style>
+          <a:lnRef idx="2">
+            <a:schemeClr val="accent1">
+              <a:shade val="50000"/>
+            </a:schemeClr>
+          </a:lnRef>
+          <a:fillRef idx="1">
+            <a:schemeClr val="accent1"/>
+          </a:fillRef>
+          <a:effectRef idx="0">
+            <a:schemeClr val="accent1"/>
+          </a:effectRef>
+          <a:fontRef idx="minor">
+            <a:schemeClr val="lt1"/>
+          </a:fontRef>
+        </p:style>
+        <p:txBody>
+          <a:bodyPr rtlCol="0" anchor="ctr"/>
+          <a:lstStyle/>
+          <a:p>
+            <a:pPr algn="ctr"/>
+            <a:endParaRPr lang="en-US"/>
+          </a:p>
+        </p:txBody>
+      </p:sp>
+      <p:sp>
+        <p:nvSpPr>
+          <p:cNvPr id="10" name="Oval 9"/>
+          <p:cNvSpPr/>
+          <p:nvPr/>
+        </p:nvSpPr>
+        <p:spPr>
+          <a:xfrm>
+            <a:off x="2314403" y="4415596"/>
+            <a:ext cx="110766" cy="110766"/>
+          </a:xfrm>
+          <a:prstGeom prst="ellipse">
+            <a:avLst/>
+          </a:prstGeom>
+          <a:solidFill>
+            <a:srgbClr val="0070C0"/>
+          </a:solidFill>
+          <a:ln w="12700">
+            <a:solidFill>
+              <a:schemeClr val="tx1"/>
+            </a:solidFill>
+          </a:ln>
+        </p:spPr>
+        <p:style>
+          <a:lnRef idx="2">
+            <a:schemeClr val="accent1">
+              <a:shade val="50000"/>
+            </a:schemeClr>
+          </a:lnRef>
+          <a:fillRef idx="1">
+            <a:schemeClr val="accent1"/>
+          </a:fillRef>
+          <a:effectRef idx="0">
+            <a:schemeClr val="accent1"/>
+          </a:effectRef>
+          <a:fontRef idx="minor">
+            <a:schemeClr val="lt1"/>
+          </a:fontRef>
+        </p:style>
+        <p:txBody>
+          <a:bodyPr rtlCol="0" anchor="ctr"/>
+          <a:lstStyle/>
+          <a:p>
+            <a:pPr algn="ctr"/>
+            <a:endParaRPr lang="en-US"/>
+          </a:p>
+        </p:txBody>
+      </p:sp>
+      <p:sp>
+        <p:nvSpPr>
+          <p:cNvPr id="11" name="Oval 10"/>
+          <p:cNvSpPr/>
+          <p:nvPr/>
+        </p:nvSpPr>
+        <p:spPr>
+          <a:xfrm>
+            <a:off x="2801497" y="3362960"/>
+            <a:ext cx="110766" cy="110766"/>
+          </a:xfrm>
+          <a:prstGeom prst="ellipse">
+            <a:avLst/>
+          </a:prstGeom>
+          <a:solidFill>
+            <a:srgbClr val="0070C0"/>
+          </a:solidFill>
+          <a:ln w="12700">
+            <a:solidFill>
+              <a:schemeClr val="tx1"/>
+            </a:solidFill>
+          </a:ln>
+        </p:spPr>
+        <p:style>
+          <a:lnRef idx="2">
+            <a:schemeClr val="accent1">
+              <a:shade val="50000"/>
+            </a:schemeClr>
+          </a:lnRef>
+          <a:fillRef idx="1">
+            <a:schemeClr val="accent1"/>
+          </a:fillRef>
+          <a:effectRef idx="0">
+            <a:schemeClr val="accent1"/>
+          </a:effectRef>
+          <a:fontRef idx="minor">
+            <a:schemeClr val="lt1"/>
+          </a:fontRef>
+        </p:style>
+        <p:txBody>
+          <a:bodyPr rtlCol="0" anchor="ctr"/>
+          <a:lstStyle/>
+          <a:p>
+            <a:pPr algn="ctr"/>
+            <a:endParaRPr lang="en-US"/>
+          </a:p>
+        </p:txBody>
+      </p:sp>
+      <p:sp>
+        <p:nvSpPr>
+          <p:cNvPr id="12" name="TextBox 11"/>
+          <p:cNvSpPr txBox="1"/>
+          <p:nvPr/>
+        </p:nvSpPr>
+        <p:spPr>
+          <a:xfrm>
+            <a:off x="2487914" y="4155474"/>
+            <a:ext cx="433132" cy="215444"/>
+          </a:xfrm>
+          <a:prstGeom prst="rect">
+            <a:avLst/>
+          </a:prstGeom>
+          <a:noFill/>
+        </p:spPr>
+        <p:txBody>
+          <a:bodyPr wrap="none" rtlCol="0">
+            <a:spAutoFit/>
+          </a:bodyPr>
+          <a:lstStyle/>
+          <a:p>
+            <a:r>
+              <a:rPr lang="en-US" sz="800" dirty="0" smtClean="0"/>
+              <a:t>S.Port</a:t>
+            </a:r>
+            <a:endParaRPr lang="en-US" sz="800" dirty="0"/>
+          </a:p>
+        </p:txBody>
+      </p:sp>
+      <p:sp>
+        <p:nvSpPr>
+          <p:cNvPr id="13" name="TextBox 12"/>
+          <p:cNvSpPr txBox="1"/>
+          <p:nvPr/>
+        </p:nvSpPr>
+        <p:spPr>
+          <a:xfrm>
+            <a:off x="2491571" y="4363257"/>
+            <a:ext cx="700833" cy="215444"/>
+          </a:xfrm>
+          <a:prstGeom prst="rect">
+            <a:avLst/>
+          </a:prstGeom>
+          <a:noFill/>
+        </p:spPr>
+        <p:txBody>
+          <a:bodyPr wrap="none" rtlCol="0">
+            <a:spAutoFit/>
+          </a:bodyPr>
+          <a:lstStyle/>
+          <a:p>
+            <a:r>
+              <a:rPr lang="en-US" sz="800" dirty="0" smtClean="0"/>
+              <a:t>Smart Audio</a:t>
+            </a:r>
+            <a:endParaRPr lang="en-US" sz="800" dirty="0"/>
+          </a:p>
+        </p:txBody>
+      </p:sp>
+      <p:sp>
+        <p:nvSpPr>
+          <p:cNvPr id="14" name="Oval 13"/>
+          <p:cNvSpPr/>
+          <p:nvPr/>
+        </p:nvSpPr>
+        <p:spPr>
+          <a:xfrm>
+            <a:off x="2314403" y="4648200"/>
+            <a:ext cx="110766" cy="110766"/>
+          </a:xfrm>
+          <a:prstGeom prst="ellipse">
+            <a:avLst/>
+          </a:prstGeom>
+          <a:solidFill>
+            <a:schemeClr val="accent4"/>
+          </a:solidFill>
+          <a:ln w="12700">
+            <a:solidFill>
+              <a:schemeClr val="tx1"/>
+            </a:solidFill>
+          </a:ln>
+        </p:spPr>
+        <p:style>
+          <a:lnRef idx="2">
+            <a:schemeClr val="accent1">
+              <a:shade val="50000"/>
+            </a:schemeClr>
+          </a:lnRef>
+          <a:fillRef idx="1">
+            <a:schemeClr val="accent1"/>
+          </a:fillRef>
+          <a:effectRef idx="0">
+            <a:schemeClr val="accent1"/>
+          </a:effectRef>
+          <a:fontRef idx="minor">
+            <a:schemeClr val="lt1"/>
+          </a:fontRef>
+        </p:style>
+        <p:txBody>
+          <a:bodyPr rtlCol="0" anchor="ctr"/>
+          <a:lstStyle/>
+          <a:p>
+            <a:pPr algn="ctr"/>
+            <a:endParaRPr lang="en-US"/>
+          </a:p>
+        </p:txBody>
+      </p:sp>
+      <p:sp>
+        <p:nvSpPr>
+          <p:cNvPr id="15" name="Oval 14"/>
+          <p:cNvSpPr/>
+          <p:nvPr/>
+        </p:nvSpPr>
+        <p:spPr>
+          <a:xfrm>
+            <a:off x="2072640" y="3214748"/>
+            <a:ext cx="110766" cy="110766"/>
+          </a:xfrm>
+          <a:prstGeom prst="ellipse">
+            <a:avLst/>
+          </a:prstGeom>
+          <a:solidFill>
+            <a:schemeClr val="accent4"/>
+          </a:solidFill>
+          <a:ln w="12700">
+            <a:solidFill>
+              <a:schemeClr val="tx1"/>
+            </a:solidFill>
+          </a:ln>
+        </p:spPr>
+        <p:style>
+          <a:lnRef idx="2">
+            <a:schemeClr val="accent1">
+              <a:shade val="50000"/>
+            </a:schemeClr>
+          </a:lnRef>
+          <a:fillRef idx="1">
+            <a:schemeClr val="accent1"/>
+          </a:fillRef>
+          <a:effectRef idx="0">
+            <a:schemeClr val="accent1"/>
+          </a:effectRef>
+          <a:fontRef idx="minor">
+            <a:schemeClr val="lt1"/>
+          </a:fontRef>
+        </p:style>
+        <p:txBody>
+          <a:bodyPr rtlCol="0" anchor="ctr"/>
+          <a:lstStyle/>
+          <a:p>
+            <a:pPr algn="ctr"/>
+            <a:endParaRPr lang="en-US"/>
+          </a:p>
+        </p:txBody>
+      </p:sp>
+      <p:sp>
+        <p:nvSpPr>
+          <p:cNvPr id="16" name="Oval 15"/>
+          <p:cNvSpPr/>
+          <p:nvPr/>
+        </p:nvSpPr>
+        <p:spPr>
+          <a:xfrm>
+            <a:off x="3253499" y="4631040"/>
+            <a:ext cx="110766" cy="110766"/>
+          </a:xfrm>
+          <a:prstGeom prst="ellipse">
+            <a:avLst/>
+          </a:prstGeom>
+          <a:solidFill>
+            <a:schemeClr val="accent6">
+              <a:lumMod val="75000"/>
+            </a:schemeClr>
+          </a:solidFill>
+          <a:ln w="12700">
+            <a:solidFill>
+              <a:schemeClr val="tx1"/>
+            </a:solidFill>
+          </a:ln>
+        </p:spPr>
+        <p:style>
+          <a:lnRef idx="2">
+            <a:schemeClr val="accent1">
+              <a:shade val="50000"/>
+            </a:schemeClr>
+          </a:lnRef>
+          <a:fillRef idx="1">
+            <a:schemeClr val="accent1"/>
+          </a:fillRef>
+          <a:effectRef idx="0">
+            <a:schemeClr val="accent1"/>
+          </a:effectRef>
+          <a:fontRef idx="minor">
+            <a:schemeClr val="lt1"/>
+          </a:fontRef>
+        </p:style>
+        <p:txBody>
+          <a:bodyPr rtlCol="0" anchor="ctr"/>
+          <a:lstStyle/>
+          <a:p>
+            <a:pPr algn="ctr"/>
+            <a:endParaRPr lang="en-US"/>
+          </a:p>
+        </p:txBody>
+      </p:sp>
+      <p:sp>
+        <p:nvSpPr>
+          <p:cNvPr id="17" name="Oval 16"/>
+          <p:cNvSpPr/>
+          <p:nvPr/>
+        </p:nvSpPr>
+        <p:spPr>
+          <a:xfrm>
+            <a:off x="2072143" y="3352800"/>
+            <a:ext cx="110766" cy="110766"/>
+          </a:xfrm>
+          <a:prstGeom prst="ellipse">
+            <a:avLst/>
+          </a:prstGeom>
+          <a:solidFill>
+            <a:schemeClr val="accent6">
+              <a:lumMod val="75000"/>
+            </a:schemeClr>
+          </a:solidFill>
+          <a:ln w="12700">
+            <a:solidFill>
+              <a:schemeClr val="tx1"/>
+            </a:solidFill>
+          </a:ln>
+        </p:spPr>
+        <p:style>
+          <a:lnRef idx="2">
+            <a:schemeClr val="accent1">
+              <a:shade val="50000"/>
+            </a:schemeClr>
+          </a:lnRef>
+          <a:fillRef idx="1">
+            <a:schemeClr val="accent1"/>
+          </a:fillRef>
+          <a:effectRef idx="0">
+            <a:schemeClr val="accent1"/>
+          </a:effectRef>
+          <a:fontRef idx="minor">
+            <a:schemeClr val="lt1"/>
+          </a:fontRef>
+        </p:style>
+        <p:txBody>
+          <a:bodyPr rtlCol="0" anchor="ctr"/>
+          <a:lstStyle/>
+          <a:p>
+            <a:pPr algn="ctr"/>
+            <a:endParaRPr lang="en-US"/>
+          </a:p>
+        </p:txBody>
+      </p:sp>
+      <p:sp>
+        <p:nvSpPr>
+          <p:cNvPr id="18" name="TextBox 17"/>
+          <p:cNvSpPr txBox="1"/>
+          <p:nvPr/>
+        </p:nvSpPr>
+        <p:spPr>
+          <a:xfrm>
+            <a:off x="2491571" y="4595861"/>
+            <a:ext cx="715260" cy="215444"/>
+          </a:xfrm>
+          <a:prstGeom prst="rect">
+            <a:avLst/>
+          </a:prstGeom>
+          <a:noFill/>
+        </p:spPr>
+        <p:txBody>
+          <a:bodyPr wrap="none" rtlCol="0">
+            <a:spAutoFit/>
+          </a:bodyPr>
+          <a:lstStyle/>
+          <a:p>
+            <a:r>
+              <a:rPr lang="en-US" sz="800" dirty="0" smtClean="0"/>
+              <a:t>TX to GPS RX</a:t>
+            </a:r>
+            <a:endParaRPr lang="en-US" sz="800" dirty="0"/>
+          </a:p>
+        </p:txBody>
+      </p:sp>
+      <p:sp>
+        <p:nvSpPr>
+          <p:cNvPr id="19" name="TextBox 18"/>
+          <p:cNvSpPr txBox="1"/>
+          <p:nvPr/>
+        </p:nvSpPr>
+        <p:spPr>
+          <a:xfrm>
+            <a:off x="3430667" y="4578701"/>
+            <a:ext cx="715260" cy="215444"/>
+          </a:xfrm>
+          <a:prstGeom prst="rect">
+            <a:avLst/>
+          </a:prstGeom>
+          <a:noFill/>
+        </p:spPr>
+        <p:txBody>
+          <a:bodyPr wrap="none" rtlCol="0">
+            <a:spAutoFit/>
+          </a:bodyPr>
+          <a:lstStyle/>
+          <a:p>
+            <a:r>
+              <a:rPr lang="en-US" sz="800" dirty="0" smtClean="0"/>
+              <a:t>RX to GPS TX</a:t>
+            </a:r>
+            <a:endParaRPr lang="en-US" sz="800" dirty="0"/>
+          </a:p>
+        </p:txBody>
+      </p:sp>
+      <p:sp>
+        <p:nvSpPr>
+          <p:cNvPr id="20" name="Oval 19"/>
+          <p:cNvSpPr/>
+          <p:nvPr/>
+        </p:nvSpPr>
+        <p:spPr>
+          <a:xfrm>
+            <a:off x="3253499" y="4207813"/>
+            <a:ext cx="110766" cy="110766"/>
+          </a:xfrm>
+          <a:prstGeom prst="ellipse">
+            <a:avLst/>
+          </a:prstGeom>
+          <a:solidFill>
+            <a:srgbClr val="FF0000"/>
+          </a:solidFill>
+          <a:ln w="12700">
+            <a:solidFill>
+              <a:schemeClr val="tx1"/>
+            </a:solidFill>
+          </a:ln>
+        </p:spPr>
+        <p:style>
+          <a:lnRef idx="2">
+            <a:schemeClr val="accent1">
+              <a:shade val="50000"/>
+            </a:schemeClr>
+          </a:lnRef>
+          <a:fillRef idx="1">
+            <a:schemeClr val="accent1"/>
+          </a:fillRef>
+          <a:effectRef idx="0">
+            <a:schemeClr val="accent1"/>
+          </a:effectRef>
+          <a:fontRef idx="minor">
+            <a:schemeClr val="lt1"/>
+          </a:fontRef>
+        </p:style>
+        <p:txBody>
+          <a:bodyPr rtlCol="0" anchor="ctr"/>
+          <a:lstStyle/>
+          <a:p>
+            <a:pPr algn="ctr"/>
+            <a:endParaRPr lang="en-US"/>
+          </a:p>
+        </p:txBody>
+      </p:sp>
+      <p:sp>
+        <p:nvSpPr>
+          <p:cNvPr id="21" name="Oval 20"/>
+          <p:cNvSpPr/>
+          <p:nvPr/>
+        </p:nvSpPr>
+        <p:spPr>
+          <a:xfrm>
+            <a:off x="3253499" y="4415596"/>
+            <a:ext cx="110766" cy="110766"/>
+          </a:xfrm>
+          <a:prstGeom prst="ellipse">
+            <a:avLst/>
+          </a:prstGeom>
+          <a:solidFill>
+            <a:srgbClr val="00B050"/>
+          </a:solidFill>
+          <a:ln w="12700">
+            <a:solidFill>
+              <a:schemeClr val="tx1"/>
+            </a:solidFill>
+          </a:ln>
+        </p:spPr>
+        <p:style>
+          <a:lnRef idx="2">
+            <a:schemeClr val="accent1">
+              <a:shade val="50000"/>
+            </a:schemeClr>
+          </a:lnRef>
+          <a:fillRef idx="1">
+            <a:schemeClr val="accent1"/>
+          </a:fillRef>
+          <a:effectRef idx="0">
+            <a:schemeClr val="accent1"/>
+          </a:effectRef>
+          <a:fontRef idx="minor">
+            <a:schemeClr val="lt1"/>
+          </a:fontRef>
+        </p:style>
+        <p:txBody>
+          <a:bodyPr rtlCol="0" anchor="ctr"/>
+          <a:lstStyle/>
+          <a:p>
+            <a:pPr algn="ctr"/>
+            <a:endParaRPr lang="en-US"/>
+          </a:p>
+        </p:txBody>
+      </p:sp>
+      <p:sp>
+        <p:nvSpPr>
+          <p:cNvPr id="22" name="TextBox 21"/>
+          <p:cNvSpPr txBox="1"/>
+          <p:nvPr/>
+        </p:nvSpPr>
+        <p:spPr>
+          <a:xfrm>
+            <a:off x="3427010" y="4155474"/>
+            <a:ext cx="351378" cy="215444"/>
+          </a:xfrm>
+          <a:prstGeom prst="rect">
+            <a:avLst/>
+          </a:prstGeom>
+          <a:noFill/>
+        </p:spPr>
+        <p:txBody>
+          <a:bodyPr wrap="none" rtlCol="0">
+            <a:spAutoFit/>
+          </a:bodyPr>
+          <a:lstStyle/>
+          <a:p>
+            <a:r>
+              <a:rPr lang="en-US" sz="800" dirty="0" smtClean="0"/>
+              <a:t>VCC</a:t>
+            </a:r>
+            <a:endParaRPr lang="en-US" sz="800" dirty="0"/>
+          </a:p>
+        </p:txBody>
+      </p:sp>
+      <p:sp>
+        <p:nvSpPr>
+          <p:cNvPr id="23" name="TextBox 22"/>
+          <p:cNvSpPr txBox="1"/>
+          <p:nvPr/>
+        </p:nvSpPr>
+        <p:spPr>
+          <a:xfrm>
+            <a:off x="3430667" y="4363257"/>
+            <a:ext cx="377026" cy="215444"/>
+          </a:xfrm>
+          <a:prstGeom prst="rect">
+            <a:avLst/>
+          </a:prstGeom>
+          <a:noFill/>
+        </p:spPr>
+        <p:txBody>
+          <a:bodyPr wrap="none" rtlCol="0">
+            <a:spAutoFit/>
+          </a:bodyPr>
+          <a:lstStyle/>
+          <a:p>
+            <a:r>
+              <a:rPr lang="en-US" sz="800" dirty="0" smtClean="0"/>
+              <a:t>GND</a:t>
+            </a:r>
+            <a:endParaRPr lang="en-US" sz="800" dirty="0"/>
+          </a:p>
+        </p:txBody>
+      </p:sp>
+      <p:sp>
+        <p:nvSpPr>
+          <p:cNvPr id="24" name="Oval 23"/>
+          <p:cNvSpPr/>
+          <p:nvPr/>
+        </p:nvSpPr>
+        <p:spPr>
+          <a:xfrm>
+            <a:off x="3699716" y="2911834"/>
+            <a:ext cx="110766" cy="110766"/>
+          </a:xfrm>
+          <a:prstGeom prst="ellipse">
+            <a:avLst/>
+          </a:prstGeom>
+          <a:solidFill>
+            <a:srgbClr val="FF0000"/>
+          </a:solidFill>
+          <a:ln w="12700">
+            <a:solidFill>
+              <a:schemeClr val="tx1"/>
+            </a:solidFill>
+          </a:ln>
+        </p:spPr>
+        <p:style>
+          <a:lnRef idx="2">
+            <a:schemeClr val="accent1">
+              <a:shade val="50000"/>
+            </a:schemeClr>
+          </a:lnRef>
+          <a:fillRef idx="1">
+            <a:schemeClr val="accent1"/>
+          </a:fillRef>
+          <a:effectRef idx="0">
+            <a:schemeClr val="accent1"/>
+          </a:effectRef>
+          <a:fontRef idx="minor">
+            <a:schemeClr val="lt1"/>
+          </a:fontRef>
+        </p:style>
+        <p:txBody>
+          <a:bodyPr rtlCol="0" anchor="ctr"/>
+          <a:lstStyle/>
+          <a:p>
+            <a:pPr algn="ctr"/>
+            <a:endParaRPr lang="en-US"/>
+          </a:p>
+        </p:txBody>
+      </p:sp>
+      <p:sp>
+        <p:nvSpPr>
+          <p:cNvPr id="25" name="Oval 24"/>
+          <p:cNvSpPr/>
+          <p:nvPr/>
+        </p:nvSpPr>
+        <p:spPr>
+          <a:xfrm>
+            <a:off x="3543059" y="2911834"/>
+            <a:ext cx="110766" cy="110766"/>
+          </a:xfrm>
+          <a:prstGeom prst="ellipse">
+            <a:avLst/>
+          </a:prstGeom>
+          <a:solidFill>
+            <a:srgbClr val="00B050"/>
+          </a:solidFill>
+          <a:ln w="12700">
+            <a:solidFill>
+              <a:schemeClr val="tx1"/>
+            </a:solidFill>
+          </a:ln>
+        </p:spPr>
+        <p:style>
+          <a:lnRef idx="2">
+            <a:schemeClr val="accent1">
+              <a:shade val="50000"/>
+            </a:schemeClr>
+          </a:lnRef>
+          <a:fillRef idx="1">
+            <a:schemeClr val="accent1"/>
+          </a:fillRef>
+          <a:effectRef idx="0">
+            <a:schemeClr val="accent1"/>
+          </a:effectRef>
+          <a:fontRef idx="minor">
+            <a:schemeClr val="lt1"/>
+          </a:fontRef>
+        </p:style>
+        <p:txBody>
+          <a:bodyPr rtlCol="0" anchor="ctr"/>
+          <a:lstStyle/>
+          <a:p>
+            <a:pPr algn="ctr"/>
+            <a:endParaRPr lang="en-US"/>
+          </a:p>
+        </p:txBody>
+      </p:sp>
+    </p:spTree>
+    <p:extLst>
+      <p:ext uri="{BB962C8B-B14F-4D97-AF65-F5344CB8AC3E}">
+        <p14:creationId xmlns:p14="http://schemas.microsoft.com/office/powerpoint/2010/main" val="4191295749"/>
+      </p:ext>
+    </p:extLst>
+  </p:cSld>
+  <p:clrMapOvr>
+    <a:masterClrMapping/>
+  </p:clrMapOvr>
+</p:sld>
+</file>
+
 <file path=ppt/theme/theme1.xml><?xml version="1.0" encoding="utf-8"?>
 <a:theme xmlns:a="http://schemas.openxmlformats.org/drawingml/2006/main" name="Office Theme">
   <a:themeElements>

</xml_diff>